<commit_message>
added notes for trees
</commit_message>
<xml_diff>
--- a/Communication Network Technologies/Reasearch papers/Congestion Control in Network Technologies.pptx
+++ b/Communication Network Technologies/Reasearch papers/Congestion Control in Network Technologies.pptx
@@ -117,6 +117,11 @@
       </a:defRPr>
     </a:lvl9pPr>
   </p:defaultTextStyle>
+  <p:extLst>
+    <p:ext uri="{EFAFB233-063F-42B5-8137-9DF3F51BA10A}">
+      <p15:sldGuideLst xmlns:p15="http://schemas.microsoft.com/office/powerpoint/2012/main"/>
+    </p:ext>
+  </p:extLst>
 </p:presentation>
 </file>
 
@@ -3424,7 +3429,7 @@
           <a:p>
             <a:fld id="{C128FA71-3A18-48C0-980F-4B68F7F63042}" type="datetime1">
               <a:rPr lang="en-US" smtClean="0"/>
-              <a:t>2/19/2025</a:t>
+              <a:t>2/26/2025</a:t>
             </a:fld>
             <a:endParaRPr lang="en-US"/>
           </a:p>
@@ -3632,7 +3637,7 @@
           <a:p>
             <a:fld id="{7104EDB3-C0E8-45F8-9E1D-1B6C8D1880C0}" type="datetime1">
               <a:rPr lang="en-US" smtClean="0"/>
-              <a:t>2/19/2025</a:t>
+              <a:t>2/26/2025</a:t>
             </a:fld>
             <a:endParaRPr lang="en-US"/>
           </a:p>
@@ -3842,7 +3847,7 @@
           <a:p>
             <a:fld id="{9CF0EC4B-54ED-4041-B552-9BA760FA3DBA}" type="datetime1">
               <a:rPr lang="en-US" smtClean="0"/>
-              <a:t>2/19/2025</a:t>
+              <a:t>2/26/2025</a:t>
             </a:fld>
             <a:endParaRPr lang="en-US"/>
           </a:p>
@@ -4040,7 +4045,7 @@
           <a:p>
             <a:fld id="{51C1210E-201E-4473-82AC-2466F5386C38}" type="datetime1">
               <a:rPr lang="en-US" smtClean="0"/>
-              <a:t>2/19/2025</a:t>
+              <a:t>2/26/2025</a:t>
             </a:fld>
             <a:endParaRPr lang="en-US"/>
           </a:p>
@@ -4318,7 +4323,7 @@
           <a:p>
             <a:fld id="{B01EA198-6CAB-4B8F-B93F-1F9C8C4B6CE7}" type="datetime1">
               <a:rPr lang="en-US" smtClean="0"/>
-              <a:t>2/19/2025</a:t>
+              <a:t>2/26/2025</a:t>
             </a:fld>
             <a:endParaRPr lang="en-US"/>
           </a:p>
@@ -4590,7 +4595,7 @@
           <a:p>
             <a:fld id="{CA06041F-4525-44D5-AA4F-332294BF1F56}" type="datetime1">
               <a:rPr lang="en-US" smtClean="0"/>
-              <a:t>2/19/2025</a:t>
+              <a:t>2/26/2025</a:t>
             </a:fld>
             <a:endParaRPr lang="en-US"/>
           </a:p>
@@ -5014,7 +5019,7 @@
           <a:p>
             <a:fld id="{F9557091-BBDF-4EB9-BA6B-2BB67AC4FC0F}" type="datetime1">
               <a:rPr lang="en-US" smtClean="0"/>
-              <a:t>2/19/2025</a:t>
+              <a:t>2/26/2025</a:t>
             </a:fld>
             <a:endParaRPr lang="en-US"/>
           </a:p>
@@ -5155,7 +5160,7 @@
           <a:p>
             <a:fld id="{2D6B226B-77A6-410C-9796-083F278E0125}" type="datetime1">
               <a:rPr lang="en-US" smtClean="0"/>
-              <a:t>2/19/2025</a:t>
+              <a:t>2/26/2025</a:t>
             </a:fld>
             <a:endParaRPr lang="en-US"/>
           </a:p>
@@ -5268,7 +5273,7 @@
           <a:p>
             <a:fld id="{A23A578B-D289-4C40-8593-3D356C49DA58}" type="datetime1">
               <a:rPr lang="en-US" smtClean="0"/>
-              <a:t>2/19/2025</a:t>
+              <a:t>2/26/2025</a:t>
             </a:fld>
             <a:endParaRPr lang="en-US"/>
           </a:p>
@@ -5587,7 +5592,7 @@
           <a:p>
             <a:fld id="{713DFAE3-14DB-48A7-A80F-80DDB072CE3D}" type="datetime1">
               <a:rPr lang="en-US" smtClean="0"/>
-              <a:t>2/19/2025</a:t>
+              <a:t>2/26/2025</a:t>
             </a:fld>
             <a:endParaRPr lang="en-US"/>
           </a:p>
@@ -5881,7 +5886,7 @@
           <a:p>
             <a:fld id="{92C5EAEF-6478-4102-8F5D-A5FE9FC97ACB}" type="datetime1">
               <a:rPr lang="en-US" smtClean="0"/>
-              <a:t>2/19/2025</a:t>
+              <a:t>2/26/2025</a:t>
             </a:fld>
             <a:endParaRPr lang="en-US"/>
           </a:p>
@@ -6122,7 +6127,7 @@
           <a:p>
             <a:fld id="{67F45AC6-C491-4585-A584-9CE2AF7D5500}" type="datetime1">
               <a:rPr lang="en-US" smtClean="0"/>
-              <a:t>2/19/2025</a:t>
+              <a:t>2/26/2025</a:t>
             </a:fld>
             <a:endParaRPr lang="en-US"/>
           </a:p>
@@ -8893,7 +8898,7 @@
               <a:buNone/>
             </a:pPr>
             <a:r>
-              <a:rPr lang="en-US" sz="1800" kern="100">
+              <a:rPr lang="en-US" sz="1800" kern="100" dirty="0">
                 <a:effectLst/>
                 <a:latin typeface="Aptos" panose="020B0004020202020204" pitchFamily="34" charset="0"/>
                 <a:ea typeface="Aptos" panose="020B0004020202020204" pitchFamily="34" charset="0"/>
@@ -8907,20 +8912,62 @@
               <a:buNone/>
             </a:pPr>
             <a:r>
-              <a:rPr lang="en-US" sz="1800" kern="100">
-                <a:effectLst/>
-                <a:latin typeface="Aptos" panose="020B0004020202020204" pitchFamily="34" charset="0"/>
-                <a:ea typeface="Aptos" panose="020B0004020202020204" pitchFamily="34" charset="0"/>
-                <a:cs typeface="Times New Roman" panose="02020603050405020304" pitchFamily="18" charset="0"/>
-              </a:rPr>
-              <a:t>Just like traffic congestion on a busy road, network congestion leads to delays and sometimes data loss. When the network can’t handle all the incoming data, it gets “clogged,” making it difficult for information to travel smoothly from one place to another.</a:t>
+              <a:rPr lang="en-US" sz="1800" kern="100" dirty="0">
+                <a:effectLst/>
+                <a:latin typeface="Aptos" panose="020B0004020202020204" pitchFamily="34" charset="0"/>
+                <a:ea typeface="Aptos" panose="020B0004020202020204" pitchFamily="34" charset="0"/>
+                <a:cs typeface="Times New Roman" panose="02020603050405020304" pitchFamily="18" charset="0"/>
+              </a:rPr>
+              <a:t>Just like traffic congestion on a busy road, network congestion leads to </a:t>
+            </a:r>
+            <a:r>
+              <a:rPr lang="en-US" sz="1800" kern="100" dirty="0">
+                <a:effectLst/>
+                <a:highlight>
+                  <a:srgbClr val="FFFF00"/>
+                </a:highlight>
+                <a:latin typeface="Aptos" panose="020B0004020202020204" pitchFamily="34" charset="0"/>
+                <a:ea typeface="Aptos" panose="020B0004020202020204" pitchFamily="34" charset="0"/>
+                <a:cs typeface="Times New Roman" panose="02020603050405020304" pitchFamily="18" charset="0"/>
+              </a:rPr>
+              <a:t>delays</a:t>
+            </a:r>
+            <a:r>
+              <a:rPr lang="en-US" sz="1800" kern="100" dirty="0">
+                <a:effectLst/>
+                <a:latin typeface="Aptos" panose="020B0004020202020204" pitchFamily="34" charset="0"/>
+                <a:ea typeface="Aptos" panose="020B0004020202020204" pitchFamily="34" charset="0"/>
+                <a:cs typeface="Times New Roman" panose="02020603050405020304" pitchFamily="18" charset="0"/>
+              </a:rPr>
+              <a:t> and sometimes </a:t>
+            </a:r>
+            <a:r>
+              <a:rPr lang="en-US" sz="1800" kern="100" dirty="0">
+                <a:effectLst/>
+                <a:highlight>
+                  <a:srgbClr val="FFFF00"/>
+                </a:highlight>
+                <a:latin typeface="Aptos" panose="020B0004020202020204" pitchFamily="34" charset="0"/>
+                <a:ea typeface="Aptos" panose="020B0004020202020204" pitchFamily="34" charset="0"/>
+                <a:cs typeface="Times New Roman" panose="02020603050405020304" pitchFamily="18" charset="0"/>
+              </a:rPr>
+              <a:t>data loss</a:t>
+            </a:r>
+            <a:r>
+              <a:rPr lang="en-US" sz="1800" kern="100" dirty="0">
+                <a:effectLst/>
+                <a:latin typeface="Aptos" panose="020B0004020202020204" pitchFamily="34" charset="0"/>
+                <a:ea typeface="Aptos" panose="020B0004020202020204" pitchFamily="34" charset="0"/>
+                <a:cs typeface="Times New Roman" panose="02020603050405020304" pitchFamily="18" charset="0"/>
+              </a:rPr>
+              <a:t>. When the network can’t handle all the incoming data, it gets “clogged,” making it difficult for information to travel smoothly from one place to another.</a:t>
             </a:r>
           </a:p>
           <a:p>
             <a:pPr marL="0" indent="0">
               <a:buNone/>
             </a:pPr>
-            <a:endParaRPr lang="en-US" sz="1800"/>
+            <a:endParaRPr lang="en-US" sz="1800" dirty="0"/>
           </a:p>
         </p:txBody>
       </p:sp>
@@ -9003,7 +9050,7 @@
                 <a:ea typeface="Times New Roman" panose="02020603050405020304" pitchFamily="18" charset="0"/>
                 <a:cs typeface="Times New Roman" panose="02020603050405020304" pitchFamily="18" charset="0"/>
               </a:rPr>
-              <a:t>Effects of Congestion in Computer Network</a:t>
+              <a:t>Effects of Congestion Control in Computer Network</a:t>
             </a:r>
             <a:br>
               <a:rPr lang="en-US" sz="3600" b="1" kern="100" dirty="0">

</xml_diff>